<commit_message>
Update images with grammar fixes
</commit_message>
<xml_diff>
--- a/docs/images/images_source.pptx
+++ b/docs/images/images_source.pptx
@@ -274,7 +274,7 @@
           <a:p>
             <a:fld id="{20476D50-58D4-4129-A0D5-BA23D510D217}" type="datetimeFigureOut">
               <a:rPr lang="en-SG" smtClean="0"/>
-              <a:t>5/4/2024</a:t>
+              <a:t>10/4/2024</a:t>
             </a:fld>
             <a:endParaRPr lang="en-SG"/>
           </a:p>
@@ -474,7 +474,7 @@
           <a:p>
             <a:fld id="{20476D50-58D4-4129-A0D5-BA23D510D217}" type="datetimeFigureOut">
               <a:rPr lang="en-SG" smtClean="0"/>
-              <a:t>5/4/2024</a:t>
+              <a:t>10/4/2024</a:t>
             </a:fld>
             <a:endParaRPr lang="en-SG"/>
           </a:p>
@@ -684,7 +684,7 @@
           <a:p>
             <a:fld id="{20476D50-58D4-4129-A0D5-BA23D510D217}" type="datetimeFigureOut">
               <a:rPr lang="en-SG" smtClean="0"/>
-              <a:t>5/4/2024</a:t>
+              <a:t>10/4/2024</a:t>
             </a:fld>
             <a:endParaRPr lang="en-SG"/>
           </a:p>
@@ -884,7 +884,7 @@
           <a:p>
             <a:fld id="{20476D50-58D4-4129-A0D5-BA23D510D217}" type="datetimeFigureOut">
               <a:rPr lang="en-SG" smtClean="0"/>
-              <a:t>5/4/2024</a:t>
+              <a:t>10/4/2024</a:t>
             </a:fld>
             <a:endParaRPr lang="en-SG"/>
           </a:p>
@@ -1160,7 +1160,7 @@
           <a:p>
             <a:fld id="{20476D50-58D4-4129-A0D5-BA23D510D217}" type="datetimeFigureOut">
               <a:rPr lang="en-SG" smtClean="0"/>
-              <a:t>5/4/2024</a:t>
+              <a:t>10/4/2024</a:t>
             </a:fld>
             <a:endParaRPr lang="en-SG"/>
           </a:p>
@@ -1428,7 +1428,7 @@
           <a:p>
             <a:fld id="{20476D50-58D4-4129-A0D5-BA23D510D217}" type="datetimeFigureOut">
               <a:rPr lang="en-SG" smtClean="0"/>
-              <a:t>5/4/2024</a:t>
+              <a:t>10/4/2024</a:t>
             </a:fld>
             <a:endParaRPr lang="en-SG"/>
           </a:p>
@@ -1843,7 +1843,7 @@
           <a:p>
             <a:fld id="{20476D50-58D4-4129-A0D5-BA23D510D217}" type="datetimeFigureOut">
               <a:rPr lang="en-SG" smtClean="0"/>
-              <a:t>5/4/2024</a:t>
+              <a:t>10/4/2024</a:t>
             </a:fld>
             <a:endParaRPr lang="en-SG"/>
           </a:p>
@@ -1985,7 +1985,7 @@
           <a:p>
             <a:fld id="{20476D50-58D4-4129-A0D5-BA23D510D217}" type="datetimeFigureOut">
               <a:rPr lang="en-SG" smtClean="0"/>
-              <a:t>5/4/2024</a:t>
+              <a:t>10/4/2024</a:t>
             </a:fld>
             <a:endParaRPr lang="en-SG"/>
           </a:p>
@@ -2098,7 +2098,7 @@
           <a:p>
             <a:fld id="{20476D50-58D4-4129-A0D5-BA23D510D217}" type="datetimeFigureOut">
               <a:rPr lang="en-SG" smtClean="0"/>
-              <a:t>5/4/2024</a:t>
+              <a:t>10/4/2024</a:t>
             </a:fld>
             <a:endParaRPr lang="en-SG"/>
           </a:p>
@@ -2411,7 +2411,7 @@
           <a:p>
             <a:fld id="{20476D50-58D4-4129-A0D5-BA23D510D217}" type="datetimeFigureOut">
               <a:rPr lang="en-SG" smtClean="0"/>
-              <a:t>5/4/2024</a:t>
+              <a:t>10/4/2024</a:t>
             </a:fld>
             <a:endParaRPr lang="en-SG"/>
           </a:p>
@@ -2700,7 +2700,7 @@
           <a:p>
             <a:fld id="{20476D50-58D4-4129-A0D5-BA23D510D217}" type="datetimeFigureOut">
               <a:rPr lang="en-SG" smtClean="0"/>
-              <a:t>5/4/2024</a:t>
+              <a:t>10/4/2024</a:t>
             </a:fld>
             <a:endParaRPr lang="en-SG"/>
           </a:p>
@@ -2943,7 +2943,7 @@
           <a:p>
             <a:fld id="{20476D50-58D4-4129-A0D5-BA23D510D217}" type="datetimeFigureOut">
               <a:rPr lang="en-SG" smtClean="0"/>
-              <a:t>5/4/2024</a:t>
+              <a:t>10/4/2024</a:t>
             </a:fld>
             <a:endParaRPr lang="en-SG"/>
           </a:p>
@@ -5213,10 +5213,10 @@
       </p:grpSpPr>
       <p:grpSp>
         <p:nvGrpSpPr>
-          <p:cNvPr id="2" name="Group 1">
-            <a:extLst>
-              <a:ext uri="{FF2B5EF4-FFF2-40B4-BE49-F238E27FC236}">
-                <a16:creationId xmlns:a16="http://schemas.microsoft.com/office/drawing/2014/main" id="{AF577ED5-44B7-8D59-0708-1AE05C814994}"/>
+          <p:cNvPr id="8" name="Group 7">
+            <a:extLst>
+              <a:ext uri="{FF2B5EF4-FFF2-40B4-BE49-F238E27FC236}">
+                <a16:creationId xmlns:a16="http://schemas.microsoft.com/office/drawing/2014/main" id="{5B037ED8-7259-FCFF-99E9-F821991E5E60}"/>
               </a:ext>
             </a:extLst>
           </p:cNvPr>
@@ -5233,10 +5233,10 @@
         </p:grpSpPr>
         <p:pic>
           <p:nvPicPr>
-            <p:cNvPr id="3" name="Picture 2" descr="A screenshot of a computer&#10;&#10;Description automatically generated">
+            <p:cNvPr id="7" name="Picture 6" descr="A screenshot of a computer&#10;&#10;Description automatically generated">
               <a:extLst>
                 <a:ext uri="{FF2B5EF4-FFF2-40B4-BE49-F238E27FC236}">
-                  <a16:creationId xmlns:a16="http://schemas.microsoft.com/office/drawing/2014/main" id="{706ABAA2-8C9C-8933-DD2E-B2C52BEE2E26}"/>
+                  <a16:creationId xmlns:a16="http://schemas.microsoft.com/office/drawing/2014/main" id="{774C698F-C35C-9C24-BDEC-11D6F0651A05}"/>
                 </a:ext>
               </a:extLst>
             </p:cNvPr>
@@ -5408,10 +5408,10 @@
       </p:grpSpPr>
       <p:grpSp>
         <p:nvGrpSpPr>
-          <p:cNvPr id="5" name="Group 4">
-            <a:extLst>
-              <a:ext uri="{FF2B5EF4-FFF2-40B4-BE49-F238E27FC236}">
-                <a16:creationId xmlns:a16="http://schemas.microsoft.com/office/drawing/2014/main" id="{6E745BB5-CF6B-A394-86A5-EA6FDFE76CDF}"/>
+          <p:cNvPr id="8" name="Group 7">
+            <a:extLst>
+              <a:ext uri="{FF2B5EF4-FFF2-40B4-BE49-F238E27FC236}">
+                <a16:creationId xmlns:a16="http://schemas.microsoft.com/office/drawing/2014/main" id="{7F31A07F-21A0-F8FE-74AB-4D74D67359D9}"/>
               </a:ext>
             </a:extLst>
           </p:cNvPr>
@@ -5428,10 +5428,10 @@
         </p:grpSpPr>
         <p:pic>
           <p:nvPicPr>
-            <p:cNvPr id="2" name="Picture 1" descr="A screenshot of a computer&#10;&#10;Description automatically generated">
+            <p:cNvPr id="7" name="Picture 6" descr="A screenshot of a computer&#10;&#10;Description automatically generated">
               <a:extLst>
                 <a:ext uri="{FF2B5EF4-FFF2-40B4-BE49-F238E27FC236}">
-                  <a16:creationId xmlns:a16="http://schemas.microsoft.com/office/drawing/2014/main" id="{DD03C8A9-F268-6449-09F0-31A8784DB039}"/>
+                  <a16:creationId xmlns:a16="http://schemas.microsoft.com/office/drawing/2014/main" id="{A88C4560-1A21-9606-7E84-E18139EFFE0C}"/>
                 </a:ext>
               </a:extLst>
             </p:cNvPr>
@@ -5603,10 +5603,10 @@
       </p:grpSpPr>
       <p:grpSp>
         <p:nvGrpSpPr>
-          <p:cNvPr id="2" name="Group 1">
-            <a:extLst>
-              <a:ext uri="{FF2B5EF4-FFF2-40B4-BE49-F238E27FC236}">
-                <a16:creationId xmlns:a16="http://schemas.microsoft.com/office/drawing/2014/main" id="{3B3F1377-7DB6-F68C-E5EF-343ADCC58571}"/>
+          <p:cNvPr id="7" name="Group 6">
+            <a:extLst>
+              <a:ext uri="{FF2B5EF4-FFF2-40B4-BE49-F238E27FC236}">
+                <a16:creationId xmlns:a16="http://schemas.microsoft.com/office/drawing/2014/main" id="{705AC7F6-4621-A122-41E0-B4FE45595954}"/>
               </a:ext>
             </a:extLst>
           </p:cNvPr>
@@ -5623,10 +5623,10 @@
         </p:grpSpPr>
         <p:pic>
           <p:nvPicPr>
-            <p:cNvPr id="3" name="Picture 2" descr="A screenshot of a computer&#10;&#10;Description automatically generated">
+            <p:cNvPr id="6" name="Picture 5" descr="A screenshot of a computer&#10;&#10;Description automatically generated">
               <a:extLst>
                 <a:ext uri="{FF2B5EF4-FFF2-40B4-BE49-F238E27FC236}">
-                  <a16:creationId xmlns:a16="http://schemas.microsoft.com/office/drawing/2014/main" id="{63873F86-3989-D2E4-DC47-52596444A2E3}"/>
+                  <a16:creationId xmlns:a16="http://schemas.microsoft.com/office/drawing/2014/main" id="{675595AB-5A94-3812-3A8E-F18352881176}"/>
                 </a:ext>
               </a:extLst>
             </p:cNvPr>

</xml_diff>